<commit_message>
Slide and Report update
</commit_message>
<xml_diff>
--- a/Materials/Mid Defense.pptx
+++ b/Materials/Mid Defense.pptx
@@ -289,7 +289,7 @@
           <a:p>
             <a:fld id="{4B28EE81-23C2-43FE-8B79-AE57BF6429A3}" type="datetimeFigureOut">
               <a:rPr lang="en-GB" smtClean="0"/>
-              <a:t>28/09/2023</a:t>
+              <a:t>29/09/2023</a:t>
             </a:fld>
             <a:endParaRPr lang="en-GB"/>
           </a:p>
@@ -489,7 +489,7 @@
           <a:p>
             <a:fld id="{4B28EE81-23C2-43FE-8B79-AE57BF6429A3}" type="datetimeFigureOut">
               <a:rPr lang="en-GB" smtClean="0"/>
-              <a:t>28/09/2023</a:t>
+              <a:t>29/09/2023</a:t>
             </a:fld>
             <a:endParaRPr lang="en-GB"/>
           </a:p>
@@ -699,7 +699,7 @@
           <a:p>
             <a:fld id="{4B28EE81-23C2-43FE-8B79-AE57BF6429A3}" type="datetimeFigureOut">
               <a:rPr lang="en-GB" smtClean="0"/>
-              <a:t>28/09/2023</a:t>
+              <a:t>29/09/2023</a:t>
             </a:fld>
             <a:endParaRPr lang="en-GB"/>
           </a:p>
@@ -899,7 +899,7 @@
           <a:p>
             <a:fld id="{4B28EE81-23C2-43FE-8B79-AE57BF6429A3}" type="datetimeFigureOut">
               <a:rPr lang="en-GB" smtClean="0"/>
-              <a:t>28/09/2023</a:t>
+              <a:t>29/09/2023</a:t>
             </a:fld>
             <a:endParaRPr lang="en-GB"/>
           </a:p>
@@ -1175,7 +1175,7 @@
           <a:p>
             <a:fld id="{4B28EE81-23C2-43FE-8B79-AE57BF6429A3}" type="datetimeFigureOut">
               <a:rPr lang="en-GB" smtClean="0"/>
-              <a:t>28/09/2023</a:t>
+              <a:t>29/09/2023</a:t>
             </a:fld>
             <a:endParaRPr lang="en-GB"/>
           </a:p>
@@ -1443,7 +1443,7 @@
           <a:p>
             <a:fld id="{4B28EE81-23C2-43FE-8B79-AE57BF6429A3}" type="datetimeFigureOut">
               <a:rPr lang="en-GB" smtClean="0"/>
-              <a:t>28/09/2023</a:t>
+              <a:t>29/09/2023</a:t>
             </a:fld>
             <a:endParaRPr lang="en-GB"/>
           </a:p>
@@ -1858,7 +1858,7 @@
           <a:p>
             <a:fld id="{4B28EE81-23C2-43FE-8B79-AE57BF6429A3}" type="datetimeFigureOut">
               <a:rPr lang="en-GB" smtClean="0"/>
-              <a:t>28/09/2023</a:t>
+              <a:t>29/09/2023</a:t>
             </a:fld>
             <a:endParaRPr lang="en-GB"/>
           </a:p>
@@ -2000,7 +2000,7 @@
           <a:p>
             <a:fld id="{4B28EE81-23C2-43FE-8B79-AE57BF6429A3}" type="datetimeFigureOut">
               <a:rPr lang="en-GB" smtClean="0"/>
-              <a:t>28/09/2023</a:t>
+              <a:t>29/09/2023</a:t>
             </a:fld>
             <a:endParaRPr lang="en-GB"/>
           </a:p>
@@ -2113,7 +2113,7 @@
           <a:p>
             <a:fld id="{4B28EE81-23C2-43FE-8B79-AE57BF6429A3}" type="datetimeFigureOut">
               <a:rPr lang="en-GB" smtClean="0"/>
-              <a:t>28/09/2023</a:t>
+              <a:t>29/09/2023</a:t>
             </a:fld>
             <a:endParaRPr lang="en-GB"/>
           </a:p>
@@ -2426,7 +2426,7 @@
           <a:p>
             <a:fld id="{4B28EE81-23C2-43FE-8B79-AE57BF6429A3}" type="datetimeFigureOut">
               <a:rPr lang="en-GB" smtClean="0"/>
-              <a:t>28/09/2023</a:t>
+              <a:t>29/09/2023</a:t>
             </a:fld>
             <a:endParaRPr lang="en-GB"/>
           </a:p>
@@ -2715,7 +2715,7 @@
           <a:p>
             <a:fld id="{4B28EE81-23C2-43FE-8B79-AE57BF6429A3}" type="datetimeFigureOut">
               <a:rPr lang="en-GB" smtClean="0"/>
-              <a:t>28/09/2023</a:t>
+              <a:t>29/09/2023</a:t>
             </a:fld>
             <a:endParaRPr lang="en-GB"/>
           </a:p>
@@ -2958,7 +2958,7 @@
           <a:p>
             <a:fld id="{4B28EE81-23C2-43FE-8B79-AE57BF6429A3}" type="datetimeFigureOut">
               <a:rPr lang="en-GB" smtClean="0"/>
-              <a:t>28/09/2023</a:t>
+              <a:t>29/09/2023</a:t>
             </a:fld>
             <a:endParaRPr lang="en-GB"/>
           </a:p>
@@ -4501,14 +4501,119 @@
             <p:ph type="title"/>
           </p:nvPr>
         </p:nvSpPr>
-        <p:spPr/>
-        <p:txBody>
-          <a:bodyPr/>
+        <p:spPr>
+          <a:xfrm>
+            <a:off x="838200" y="365126"/>
+            <a:ext cx="10515600" cy="704020"/>
+          </a:xfrm>
+        </p:spPr>
+        <p:txBody>
+          <a:bodyPr>
+            <a:normAutofit/>
+          </a:bodyPr>
+          <a:lstStyle/>
+          <a:p>
+            <a:r>
+              <a:rPr lang="en-GB" sz="2800" b="1" dirty="0">
+                <a:latin typeface="Times New Roman" panose="02020603050405020304" pitchFamily="18" charset="0"/>
+                <a:cs typeface="Times New Roman" panose="02020603050405020304" pitchFamily="18" charset="0"/>
+              </a:rPr>
+              <a:t>Table of Contents</a:t>
+            </a:r>
+          </a:p>
+        </p:txBody>
+      </p:sp>
+      <p:sp>
+        <p:nvSpPr>
+          <p:cNvPr id="4" name="Content Placeholder 3">
+            <a:extLst>
+              <a:ext uri="{FF2B5EF4-FFF2-40B4-BE49-F238E27FC236}">
+                <a16:creationId xmlns:a16="http://schemas.microsoft.com/office/drawing/2014/main" id="{349A80D5-7AF2-FA5E-CD00-B78007813E1F}"/>
+              </a:ext>
+            </a:extLst>
+          </p:cNvPr>
+          <p:cNvSpPr>
+            <a:spLocks noGrp="1"/>
+          </p:cNvSpPr>
+          <p:nvPr>
+            <p:ph idx="1"/>
+          </p:nvPr>
+        </p:nvSpPr>
+        <p:spPr>
+          <a:xfrm>
+            <a:off x="992945" y="1389527"/>
+            <a:ext cx="10515600" cy="4351338"/>
+          </a:xfrm>
+        </p:spPr>
+        <p:txBody>
+          <a:bodyPr>
+            <a:normAutofit fontScale="85000" lnSpcReduction="20000"/>
+          </a:bodyPr>
           <a:lstStyle/>
           <a:p>
             <a:r>
               <a:rPr lang="en-GB" dirty="0"/>
-              <a:t>Table of Contents</a:t>
+              <a:t>Introduction</a:t>
+            </a:r>
+          </a:p>
+          <a:p>
+            <a:r>
+              <a:rPr lang="en-GB" dirty="0"/>
+              <a:t>Problem Statement</a:t>
+            </a:r>
+          </a:p>
+          <a:p>
+            <a:r>
+              <a:rPr lang="en-GB" dirty="0"/>
+              <a:t>Requirements</a:t>
+            </a:r>
+          </a:p>
+          <a:p>
+            <a:r>
+              <a:rPr lang="en-GB" dirty="0"/>
+              <a:t>Use Case Diagram</a:t>
+            </a:r>
+          </a:p>
+          <a:p>
+            <a:r>
+              <a:rPr lang="en-GB" dirty="0"/>
+              <a:t>Case Description</a:t>
+            </a:r>
+          </a:p>
+          <a:p>
+            <a:r>
+              <a:rPr lang="en-GB" dirty="0"/>
+              <a:t>Activity Diagram</a:t>
+            </a:r>
+          </a:p>
+          <a:p>
+            <a:r>
+              <a:rPr lang="en-GB" dirty="0"/>
+              <a:t>Sequence Diagram</a:t>
+            </a:r>
+          </a:p>
+          <a:p>
+            <a:r>
+              <a:rPr lang="en-GB" dirty="0"/>
+              <a:t>Class Diagram</a:t>
+            </a:r>
+          </a:p>
+          <a:p>
+            <a:r>
+              <a:rPr lang="en-GB" dirty="0"/>
+              <a:t>ER Diagram</a:t>
+            </a:r>
+          </a:p>
+          <a:p>
+            <a:r>
+              <a:rPr lang="en-GB" dirty="0"/>
+              <a:t>Conclusion</a:t>
+            </a:r>
+          </a:p>
+          <a:p>
+            <a:r>
+              <a:rPr lang="en-GB" dirty="0"/>
+              <a:t>References</a:t>
             </a:r>
           </a:p>
         </p:txBody>

</xml_diff>